<commit_message>
Updated slides with nested modules and added example code;
</commit_message>
<xml_diff>
--- a/Modules/Modules.pptx
+++ b/Modules/Modules.pptx
@@ -118,6 +118,11 @@
       </a:defRPr>
     </a:lvl9pPr>
   </p:defaultTextStyle>
+  <p:extLst>
+    <p:ext uri="{EFAFB233-063F-42B5-8137-9DF3F51BA10A}">
+      <p15:sldGuideLst xmlns:p15="http://schemas.microsoft.com/office/powerpoint/2012/main"/>
+    </p:ext>
+  </p:extLst>
 </p:presentation>
 </file>
 
@@ -6690,8 +6695,13 @@
           <a:p>
             <a:r>
               <a:rPr lang="en-US" dirty="0" smtClean="0"/>
-              <a:t>These slides were made using information and examples from the official Elixir Language website</a:t>
-            </a:r>
+              <a:t>These slides were made using information and examples from the official Elixir Language </a:t>
+            </a:r>
+            <a:r>
+              <a:rPr lang="en-US" dirty="0" smtClean="0"/>
+              <a:t>website and Elixir School</a:t>
+            </a:r>
+            <a:endParaRPr lang="en-US" dirty="0" smtClean="0"/>
           </a:p>
           <a:p>
             <a:pPr lvl="1"/>
@@ -6724,6 +6734,28 @@
               <a:t>elixir-lang.org/getting-started/module-attributes.html</a:t>
             </a:r>
             <a:endParaRPr lang="en-US" dirty="0" smtClean="0"/>
+          </a:p>
+          <a:p>
+            <a:pPr lvl="1"/>
+            <a:r>
+              <a:rPr lang="en-US" dirty="0">
+                <a:hlinkClick r:id="rId4"/>
+              </a:rPr>
+              <a:t>https://elixirschool.com</a:t>
+            </a:r>
+            <a:r>
+              <a:rPr lang="en-US">
+                <a:hlinkClick r:id="rId4"/>
+              </a:rPr>
+              <a:t>/lessons/basics/modules</a:t>
+            </a:r>
+            <a:r>
+              <a:rPr lang="en-US" smtClean="0">
+                <a:hlinkClick r:id="rId4"/>
+              </a:rPr>
+              <a:t>/</a:t>
+            </a:r>
+            <a:endParaRPr lang="en-US" smtClean="0"/>
           </a:p>
         </p:txBody>
       </p:sp>
@@ -6828,7 +6860,17 @@
             </a:r>
             <a:r>
               <a:rPr lang="en-US" dirty="0" smtClean="0"/>
-              <a:t> macro is used to created modules</a:t>
+              <a:t> macro is used to created </a:t>
+            </a:r>
+            <a:r>
+              <a:rPr lang="en-US" dirty="0" smtClean="0"/>
+              <a:t>modules</a:t>
+            </a:r>
+          </a:p>
+          <a:p>
+            <a:r>
+              <a:rPr lang="en-US" dirty="0" smtClean="0"/>
+              <a:t>Elixir also allows for nested modules</a:t>
             </a:r>
             <a:endParaRPr lang="en-US" dirty="0"/>
           </a:p>
@@ -6856,8 +6898,78 @@
         </p:blipFill>
         <p:spPr>
           <a:xfrm>
-            <a:off x="922469" y="3549144"/>
+            <a:off x="489722" y="3871874"/>
             <a:ext cx="3162300" cy="2806700"/>
+          </a:xfrm>
+          <a:prstGeom prst="rect">
+            <a:avLst/>
+          </a:prstGeom>
+          <a:ln>
+            <a:solidFill>
+              <a:schemeClr val="tx1"/>
+            </a:solidFill>
+          </a:ln>
+        </p:spPr>
+      </p:pic>
+      <p:pic>
+        <p:nvPicPr>
+          <p:cNvPr id="4" name="Picture 3"/>
+          <p:cNvPicPr>
+            <a:picLocks noChangeAspect="1"/>
+          </p:cNvPicPr>
+          <p:nvPr/>
+        </p:nvPicPr>
+        <p:blipFill>
+          <a:blip r:embed="rId3">
+            <a:extLst>
+              <a:ext uri="{28A0092B-C50C-407E-A947-70E740481C1C}">
+                <a14:useLocalDpi xmlns:a14="http://schemas.microsoft.com/office/drawing/2010/main" val="0"/>
+              </a:ext>
+            </a:extLst>
+          </a:blip>
+          <a:stretch>
+            <a:fillRect/>
+          </a:stretch>
+        </p:blipFill>
+        <p:spPr>
+          <a:xfrm>
+            <a:off x="3848100" y="3917217"/>
+            <a:ext cx="3632200" cy="2336800"/>
+          </a:xfrm>
+          <a:prstGeom prst="rect">
+            <a:avLst/>
+          </a:prstGeom>
+          <a:ln>
+            <a:solidFill>
+              <a:schemeClr val="tx1"/>
+            </a:solidFill>
+          </a:ln>
+        </p:spPr>
+      </p:pic>
+      <p:pic>
+        <p:nvPicPr>
+          <p:cNvPr id="7" name="Picture 6"/>
+          <p:cNvPicPr>
+            <a:picLocks noChangeAspect="1"/>
+          </p:cNvPicPr>
+          <p:nvPr/>
+        </p:nvPicPr>
+        <p:blipFill>
+          <a:blip r:embed="rId4">
+            <a:extLst>
+              <a:ext uri="{28A0092B-C50C-407E-A947-70E740481C1C}">
+                <a14:useLocalDpi xmlns:a14="http://schemas.microsoft.com/office/drawing/2010/main" val="0"/>
+              </a:ext>
+            </a:extLst>
+          </a:blip>
+          <a:stretch>
+            <a:fillRect/>
+          </a:stretch>
+        </p:blipFill>
+        <p:spPr>
+          <a:xfrm>
+            <a:off x="7676378" y="3503688"/>
+            <a:ext cx="4320791" cy="3163858"/>
           </a:xfrm>
           <a:prstGeom prst="rect">
             <a:avLst/>

</xml_diff>